<commit_message>
Fuzzing with Code Fragments
</commit_message>
<xml_diff>
--- a/Presentation/20180924_Rabin.pptx
+++ b/Presentation/20180924_Rabin.pptx
@@ -243,7 +243,7 @@
             <a:fld id="{CB3D2ACE-279A-4319-8204-FE4A3DAF1277}" type="datetimeFigureOut">
               <a:rPr lang="en-US" smtClean="0"/>
               <a:pPr/>
-              <a:t>9/24/2018</a:t>
+              <a:t>9/5/19</a:t>
             </a:fld>
             <a:endParaRPr lang="en-US"/>
           </a:p>
@@ -3003,7 +3003,7 @@
             <a:fld id="{B61BEF0D-F0BB-DE4B-95CE-6DB70DBA9567}" type="datetimeFigureOut">
               <a:rPr lang="en-US" smtClean="0"/>
               <a:pPr/>
-              <a:t>9/24/2018</a:t>
+              <a:t>9/5/19</a:t>
             </a:fld>
             <a:endParaRPr lang="en-US" dirty="0"/>
           </a:p>
@@ -3184,7 +3184,7 @@
             <a:fld id="{B61BEF0D-F0BB-DE4B-95CE-6DB70DBA9567}" type="datetimeFigureOut">
               <a:rPr lang="en-US" smtClean="0"/>
               <a:pPr/>
-              <a:t>9/24/2018</a:t>
+              <a:t>9/5/19</a:t>
             </a:fld>
             <a:endParaRPr lang="en-US" dirty="0"/>
           </a:p>
@@ -3366,7 +3366,7 @@
             <a:fld id="{B61BEF0D-F0BB-DE4B-95CE-6DB70DBA9567}" type="datetimeFigureOut">
               <a:rPr lang="en-US" smtClean="0"/>
               <a:pPr/>
-              <a:t>9/24/2018</a:t>
+              <a:t>9/5/19</a:t>
             </a:fld>
             <a:endParaRPr lang="en-US" dirty="0"/>
           </a:p>
@@ -3538,7 +3538,7 @@
             <a:fld id="{B61BEF0D-F0BB-DE4B-95CE-6DB70DBA9567}" type="datetimeFigureOut">
               <a:rPr lang="en-US" smtClean="0"/>
               <a:pPr/>
-              <a:t>9/24/2018</a:t>
+              <a:t>9/5/19</a:t>
             </a:fld>
             <a:endParaRPr lang="en-US" dirty="0"/>
           </a:p>
@@ -3853,7 +3853,7 @@
             <a:fld id="{B61BEF0D-F0BB-DE4B-95CE-6DB70DBA9567}" type="datetimeFigureOut">
               <a:rPr lang="en-US" smtClean="0"/>
               <a:pPr/>
-              <a:t>9/24/2018</a:t>
+              <a:t>9/5/19</a:t>
             </a:fld>
             <a:endParaRPr lang="en-US" dirty="0"/>
           </a:p>
@@ -4241,7 +4241,7 @@
             <a:fld id="{B61BEF0D-F0BB-DE4B-95CE-6DB70DBA9567}" type="datetimeFigureOut">
               <a:rPr lang="en-US" smtClean="0"/>
               <a:pPr/>
-              <a:t>9/24/2018</a:t>
+              <a:t>9/5/19</a:t>
             </a:fld>
             <a:endParaRPr lang="en-US" dirty="0"/>
           </a:p>
@@ -4677,7 +4677,7 @@
             <a:fld id="{B61BEF0D-F0BB-DE4B-95CE-6DB70DBA9567}" type="datetimeFigureOut">
               <a:rPr lang="en-US" smtClean="0"/>
               <a:pPr/>
-              <a:t>9/24/2018</a:t>
+              <a:t>9/5/19</a:t>
             </a:fld>
             <a:endParaRPr lang="en-US" dirty="0"/>
           </a:p>
@@ -4797,7 +4797,7 @@
             <a:fld id="{B61BEF0D-F0BB-DE4B-95CE-6DB70DBA9567}" type="datetimeFigureOut">
               <a:rPr lang="en-US" smtClean="0"/>
               <a:pPr/>
-              <a:t>9/24/2018</a:t>
+              <a:t>9/5/19</a:t>
             </a:fld>
             <a:endParaRPr lang="en-US" dirty="0"/>
           </a:p>
@@ -4894,7 +4894,7 @@
             <a:fld id="{B61BEF0D-F0BB-DE4B-95CE-6DB70DBA9567}" type="datetimeFigureOut">
               <a:rPr lang="en-US" smtClean="0"/>
               <a:pPr/>
-              <a:t>9/24/2018</a:t>
+              <a:t>9/5/19</a:t>
             </a:fld>
             <a:endParaRPr lang="en-US" dirty="0"/>
           </a:p>
@@ -5246,7 +5246,7 @@
             <a:fld id="{B61BEF0D-F0BB-DE4B-95CE-6DB70DBA9567}" type="datetimeFigureOut">
               <a:rPr lang="en-US" smtClean="0"/>
               <a:pPr/>
-              <a:t>9/24/2018</a:t>
+              <a:t>9/5/19</a:t>
             </a:fld>
             <a:endParaRPr lang="en-US" dirty="0"/>
           </a:p>
@@ -5673,7 +5673,7 @@
             <a:fld id="{B61BEF0D-F0BB-DE4B-95CE-6DB70DBA9567}" type="datetimeFigureOut">
               <a:rPr lang="en-US" smtClean="0"/>
               <a:pPr/>
-              <a:t>9/24/2018</a:t>
+              <a:t>9/5/19</a:t>
             </a:fld>
             <a:endParaRPr lang="en-US" dirty="0"/>
           </a:p>
@@ -5956,7 +5956,7 @@
             <a:fld id="{B61BEF0D-F0BB-DE4B-95CE-6DB70DBA9567}" type="datetimeFigureOut">
               <a:rPr lang="en-US" smtClean="0"/>
               <a:pPr/>
-              <a:t>9/24/2018</a:t>
+              <a:t>9/5/19</a:t>
             </a:fld>
             <a:endParaRPr lang="en-US" dirty="0"/>
           </a:p>
@@ -6535,39 +6535,6 @@
       </p:grpSpPr>
       <p:sp>
         <p:nvSpPr>
-          <p:cNvPr id="4" name="Title 3"/>
-          <p:cNvSpPr>
-            <a:spLocks noGrp="1"/>
-          </p:cNvSpPr>
-          <p:nvPr>
-            <p:ph type="ctrTitle"/>
-          </p:nvPr>
-        </p:nvSpPr>
-        <p:spPr>
-          <a:xfrm>
-            <a:off x="369916" y="1493520"/>
-            <a:ext cx="11795760" cy="777240"/>
-          </a:xfrm>
-        </p:spPr>
-        <p:txBody>
-          <a:bodyPr>
-            <a:normAutofit/>
-          </a:bodyPr>
-          <a:lstStyle/>
-          <a:p>
-            <a:pPr algn="ctr"/>
-            <a:r>
-              <a:rPr lang="en-US" sz="2400" b="1" dirty="0">
-                <a:latin typeface="Times New Roman" panose="02020603050405020304" pitchFamily="18" charset="0"/>
-                <a:cs typeface="Times New Roman" panose="02020603050405020304" pitchFamily="18" charset="0"/>
-              </a:rPr>
-              <a:t>Fuzzing with Code Fragments</a:t>
-            </a:r>
-          </a:p>
-        </p:txBody>
-      </p:sp>
-      <p:sp>
-        <p:nvSpPr>
           <p:cNvPr id="6" name="Subtitle 5"/>
           <p:cNvSpPr>
             <a:spLocks noGrp="1"/>
@@ -6641,6 +6608,44 @@
                 <a:cs typeface="Times New Roman" panose="02020603050405020304" pitchFamily="18" charset="0"/>
               </a:rPr>
               <a:t>, Andreas Zeller</a:t>
+            </a:r>
+          </a:p>
+        </p:txBody>
+      </p:sp>
+      <p:sp>
+        <p:nvSpPr>
+          <p:cNvPr id="7" name="Rectangle 6">
+            <a:extLst>
+              <a:ext uri="{FF2B5EF4-FFF2-40B4-BE49-F238E27FC236}">
+                <a16:creationId xmlns:a16="http://schemas.microsoft.com/office/drawing/2014/main" id="{86BA25EE-9BD8-BA44-AE43-634FA06FF4B5}"/>
+              </a:ext>
+            </a:extLst>
+          </p:cNvPr>
+          <p:cNvSpPr/>
+          <p:nvPr/>
+        </p:nvSpPr>
+        <p:spPr>
+          <a:xfrm>
+            <a:off x="3902967" y="1748111"/>
+            <a:ext cx="4386065" cy="461665"/>
+          </a:xfrm>
+          <a:prstGeom prst="rect">
+            <a:avLst/>
+          </a:prstGeom>
+        </p:spPr>
+        <p:txBody>
+          <a:bodyPr wrap="square">
+            <a:spAutoFit/>
+          </a:bodyPr>
+          <a:lstStyle/>
+          <a:p>
+            <a:pPr algn="ctr"/>
+            <a:r>
+              <a:rPr lang="en-US" sz="2400" b="1" dirty="0">
+                <a:latin typeface="Times New Roman" panose="02020603050405020304" pitchFamily="18" charset="0"/>
+                <a:cs typeface="Times New Roman" panose="02020603050405020304" pitchFamily="18" charset="0"/>
+              </a:rPr>
+              <a:t>Fuzzing with Code Fragments</a:t>
             </a:r>
           </a:p>
         </p:txBody>

</xml_diff>